<commit_message>
personal report first version
</commit_message>
<xml_diff>
--- a/个人课程报告.pptx
+++ b/个人课程报告.pptx
@@ -9152,6 +9152,10 @@
           </a:p>
           <a:p>
             <a:pPr lvl="1"/>
+            <a:r>
+              <a:rPr lang="zh-CN" altLang="en-US"/>
+              <a:t>语言</a:t>
+            </a:r>
             <a:r>
               <a:rPr lang="zh-CN" altLang="en-US"/>
               <a:t>设计之初</a:t>

</xml_diff>